<commit_message>
added iTrial and trialPhase to data parameters
</commit_message>
<xml_diff>
--- a/update10112020.pptx
+++ b/update10112020.pptx
@@ -3434,7 +3434,7 @@
         </p:nvSpPr>
         <p:spPr>
           <a:xfrm>
-            <a:off x="838200" y="0"/>
+            <a:off x="889000" y="-304800"/>
             <a:ext cx="10515600" cy="1325563"/>
           </a:xfrm>
         </p:spPr>
@@ -3465,14 +3465,14 @@
           <p:nvPr>
             <p:extLst>
               <p:ext uri="{D42A27DB-BD31-4B8C-83A1-F6EECF244321}">
-                <p14:modId xmlns:p14="http://schemas.microsoft.com/office/powerpoint/2010/main" val="2479337175"/>
+                <p14:modId xmlns:p14="http://schemas.microsoft.com/office/powerpoint/2010/main" val="2619600336"/>
               </p:ext>
             </p:extLst>
           </p:nvPr>
         </p:nvGraphicFramePr>
         <p:xfrm>
-          <a:off x="653143" y="957943"/>
-          <a:ext cx="11059886" cy="5791200"/>
+          <a:off x="0" y="696686"/>
+          <a:ext cx="12192000" cy="6430941"/>
         </p:xfrm>
         <a:graphic>
           <a:graphicData uri="http://schemas.openxmlformats.org/drawingml/2006/table">
@@ -3481,14 +3481,14 @@
                 <a:tableStyleId>{5C22544A-7EE6-4342-B048-85BDC9FD1C3A}</a:tableStyleId>
               </a:tblPr>
               <a:tblGrid>
-                <a:gridCol w="1560235">
+                <a:gridCol w="1719943">
                   <a:extLst>
                     <a:ext uri="{9D8B030D-6E8A-4147-A177-3AD203B41FA5}">
                       <a16:colId xmlns:a16="http://schemas.microsoft.com/office/drawing/2014/main" val="2714433479"/>
                     </a:ext>
                   </a:extLst>
                 </a:gridCol>
-                <a:gridCol w="9499651">
+                <a:gridCol w="10472057">
                   <a:extLst>
                     <a:ext uri="{9D8B030D-6E8A-4147-A177-3AD203B41FA5}">
                       <a16:colId xmlns:a16="http://schemas.microsoft.com/office/drawing/2014/main" val="2818961322"/>
@@ -3496,7 +3496,7 @@
                   </a:extLst>
                 </a:gridCol>
               </a:tblGrid>
-              <a:tr h="265521">
+              <a:tr h="365717">
                 <a:tc>
                   <a:txBody>
                     <a:bodyPr/>
@@ -3529,7 +3529,7 @@
                   </a:ext>
                 </a:extLst>
               </a:tr>
-              <a:tr h="370840">
+              <a:tr h="640005">
                 <a:tc>
                   <a:txBody>
                     <a:bodyPr/>
@@ -3582,7 +3582,7 @@
                   </a:ext>
                 </a:extLst>
               </a:tr>
-              <a:tr h="370840">
+              <a:tr h="370796">
                 <a:tc>
                   <a:txBody>
                     <a:bodyPr/>
@@ -3619,7 +3619,7 @@
                   </a:ext>
                 </a:extLst>
               </a:tr>
-              <a:tr h="370840">
+              <a:tr h="370796">
                 <a:tc>
                   <a:txBody>
                     <a:bodyPr/>
@@ -3656,7 +3656,7 @@
                   </a:ext>
                 </a:extLst>
               </a:tr>
-              <a:tr h="370840">
+              <a:tr h="640005">
                 <a:tc>
                   <a:txBody>
                     <a:bodyPr/>
@@ -3699,7 +3699,7 @@
                   </a:ext>
                 </a:extLst>
               </a:tr>
-              <a:tr h="370840">
+              <a:tr h="370796">
                 <a:tc>
                   <a:txBody>
                     <a:bodyPr/>
@@ -3724,7 +3724,7 @@
                     <a:p>
                       <a:r>
                         <a:rPr lang="en-US" dirty="0"/>
-                        <a:t>Return “success” data attribute (</a:t>
+                        <a:t>Implement “success” data attribute (</a:t>
                       </a:r>
                       <a:r>
                         <a:rPr lang="en-US" i="1" dirty="0"/>
@@ -3756,7 +3756,7 @@
                   </a:ext>
                 </a:extLst>
               </a:tr>
-              <a:tr h="370840">
+              <a:tr h="370796">
                 <a:tc>
                   <a:txBody>
                     <a:bodyPr/>
@@ -3793,7 +3793,7 @@
                   </a:ext>
                 </a:extLst>
               </a:tr>
-              <a:tr h="370840">
+              <a:tr h="370796">
                 <a:tc>
                   <a:txBody>
                     <a:bodyPr/>
@@ -3843,7 +3843,7 @@
                   </a:ext>
                 </a:extLst>
               </a:tr>
-              <a:tr h="370840">
+              <a:tr h="640005">
                 <a:tc>
                   <a:txBody>
                     <a:bodyPr/>
@@ -3896,7 +3896,7 @@
                   </a:ext>
                 </a:extLst>
               </a:tr>
-              <a:tr h="370840">
+              <a:tr h="640005">
                 <a:tc>
                   <a:txBody>
                     <a:bodyPr/>
@@ -3933,7 +3933,7 @@
                   </a:ext>
                 </a:extLst>
               </a:tr>
-              <a:tr h="370840">
+              <a:tr h="370796">
                 <a:tc>
                   <a:txBody>
                     <a:bodyPr/>
@@ -3983,7 +3983,15 @@
                       </a:r>
                       <a:r>
                         <a:rPr lang="en-US" i="0" dirty="0"/>
-                        <a:t>, and </a:t>
+                        <a:t>, </a:t>
+                      </a:r>
+                      <a:r>
+                        <a:rPr lang="en-US" i="1" dirty="0"/>
+                        <a:t>Trial,</a:t>
+                      </a:r>
+                      <a:r>
+                        <a:rPr lang="en-US" i="0" dirty="0"/>
+                        <a:t> and </a:t>
                       </a:r>
                       <a:r>
                         <a:rPr lang="en-US" i="1" dirty="0" err="1"/>
@@ -4004,7 +4012,7 @@
                   </a:ext>
                 </a:extLst>
               </a:tr>
-              <a:tr h="370840">
+              <a:tr h="640005">
                 <a:tc>
                   <a:txBody>
                     <a:bodyPr/>
@@ -4033,11 +4041,7 @@
                       </a:r>
                       <a:r>
                         <a:rPr lang="en-US" b="1" dirty="0"/>
-                        <a:t>confirm KDEF face-directory with Elizabeth, and </a:t>
-                      </a:r>
-                      <a:r>
-                        <a:rPr lang="en-US" b="1"/>
-                        <a:t>phase-scrambling technique) </a:t>
+                        <a:t>confirm KDEF face-directory with Elizabeth, and phase-scrambling technique) </a:t>
                       </a:r>
                       <a:endParaRPr lang="en-US" dirty="0"/>
                     </a:p>
@@ -4047,6 +4051,72 @@
                 <a:extLst>
                   <a:ext uri="{0D108BD9-81ED-4DB2-BD59-A6C34878D82A}">
                     <a16:rowId xmlns:a16="http://schemas.microsoft.com/office/drawing/2014/main" val="1863990517"/>
+                  </a:ext>
+                </a:extLst>
+              </a:tr>
+              <a:tr h="370796">
+                <a:tc>
+                  <a:txBody>
+                    <a:bodyPr/>
+                    <a:lstStyle/>
+                    <a:p>
+                      <a:pPr marL="0" marR="0" lvl="0" indent="0" algn="l" defTabSz="914400" rtl="0" eaLnBrk="1" fontAlgn="auto" latinLnBrk="0" hangingPunct="1">
+                        <a:lnSpc>
+                          <a:spcPct val="100000"/>
+                        </a:lnSpc>
+                        <a:spcBef>
+                          <a:spcPts val="0"/>
+                        </a:spcBef>
+                        <a:spcAft>
+                          <a:spcPts val="0"/>
+                        </a:spcAft>
+                        <a:buClrTx/>
+                        <a:buSzTx/>
+                        <a:buFontTx/>
+                        <a:buNone/>
+                        <a:tabLst/>
+                        <a:defRPr/>
+                      </a:pPr>
+                      <a:r>
+                        <a:rPr lang="en-US" b="1" dirty="0">
+                          <a:solidFill>
+                            <a:srgbClr val="FF0000"/>
+                          </a:solidFill>
+                        </a:rPr>
+                        <a:t>Not Done</a:t>
+                      </a:r>
+                    </a:p>
+                    <a:p>
+                      <a:endParaRPr lang="en-US" b="1" dirty="0">
+                        <a:solidFill>
+                          <a:srgbClr val="FF0000"/>
+                        </a:solidFill>
+                      </a:endParaRPr>
+                    </a:p>
+                  </a:txBody>
+                  <a:tcPr/>
+                </a:tc>
+                <a:tc>
+                  <a:txBody>
+                    <a:bodyPr/>
+                    <a:lstStyle/>
+                    <a:p>
+                      <a:r>
+                        <a:rPr lang="en-US" dirty="0"/>
+                        <a:t>Begin pilot analysis of excel file (</a:t>
+                      </a:r>
+                      <a:r>
+                        <a:rPr lang="en-US" b="1" dirty="0"/>
+                        <a:t>in which language? – ask Elizabeth) </a:t>
+                      </a:r>
+                      <a:endParaRPr lang="en-US" dirty="0"/>
+                    </a:p>
+                  </a:txBody>
+                  <a:tcPr/>
+                </a:tc>
+                <a:extLst>
+                  <a:ext uri="{0D108BD9-81ED-4DB2-BD59-A6C34878D82A}">
+                    <a16:rowId xmlns:a16="http://schemas.microsoft.com/office/drawing/2014/main" val="3650923543"/>
                   </a:ext>
                 </a:extLst>
               </a:tr>

</xml_diff>

<commit_message>
changed system of selecting random disgust and neutral faces such that it is slightly more high-level: instead of using built-in JSpsych randomization funciton I know generate a random integer and select objects from array. The purpose is that this intermediate index value will allow me to select congruent phase scrambled masks
</commit_message>
<xml_diff>
--- a/update10112020.pptx
+++ b/update10112020.pptx
@@ -263,7 +263,7 @@
           <a:p>
             <a:fld id="{2B467E7D-74A8-4588-B5EC-E88FCE43EB7F}" type="datetimeFigureOut">
               <a:rPr lang="en-US" smtClean="0"/>
-              <a:t>10/12/2020</a:t>
+              <a:t>10/13/2020</a:t>
             </a:fld>
             <a:endParaRPr lang="en-US"/>
           </a:p>
@@ -461,7 +461,7 @@
           <a:p>
             <a:fld id="{2B467E7D-74A8-4588-B5EC-E88FCE43EB7F}" type="datetimeFigureOut">
               <a:rPr lang="en-US" smtClean="0"/>
-              <a:t>10/12/2020</a:t>
+              <a:t>10/13/2020</a:t>
             </a:fld>
             <a:endParaRPr lang="en-US"/>
           </a:p>
@@ -669,7 +669,7 @@
           <a:p>
             <a:fld id="{2B467E7D-74A8-4588-B5EC-E88FCE43EB7F}" type="datetimeFigureOut">
               <a:rPr lang="en-US" smtClean="0"/>
-              <a:t>10/12/2020</a:t>
+              <a:t>10/13/2020</a:t>
             </a:fld>
             <a:endParaRPr lang="en-US"/>
           </a:p>
@@ -867,7 +867,7 @@
           <a:p>
             <a:fld id="{2B467E7D-74A8-4588-B5EC-E88FCE43EB7F}" type="datetimeFigureOut">
               <a:rPr lang="en-US" smtClean="0"/>
-              <a:t>10/12/2020</a:t>
+              <a:t>10/13/2020</a:t>
             </a:fld>
             <a:endParaRPr lang="en-US"/>
           </a:p>
@@ -1142,7 +1142,7 @@
           <a:p>
             <a:fld id="{2B467E7D-74A8-4588-B5EC-E88FCE43EB7F}" type="datetimeFigureOut">
               <a:rPr lang="en-US" smtClean="0"/>
-              <a:t>10/12/2020</a:t>
+              <a:t>10/13/2020</a:t>
             </a:fld>
             <a:endParaRPr lang="en-US"/>
           </a:p>
@@ -1407,7 +1407,7 @@
           <a:p>
             <a:fld id="{2B467E7D-74A8-4588-B5EC-E88FCE43EB7F}" type="datetimeFigureOut">
               <a:rPr lang="en-US" smtClean="0"/>
-              <a:t>10/12/2020</a:t>
+              <a:t>10/13/2020</a:t>
             </a:fld>
             <a:endParaRPr lang="en-US"/>
           </a:p>
@@ -1819,7 +1819,7 @@
           <a:p>
             <a:fld id="{2B467E7D-74A8-4588-B5EC-E88FCE43EB7F}" type="datetimeFigureOut">
               <a:rPr lang="en-US" smtClean="0"/>
-              <a:t>10/12/2020</a:t>
+              <a:t>10/13/2020</a:t>
             </a:fld>
             <a:endParaRPr lang="en-US"/>
           </a:p>
@@ -1960,7 +1960,7 @@
           <a:p>
             <a:fld id="{2B467E7D-74A8-4588-B5EC-E88FCE43EB7F}" type="datetimeFigureOut">
               <a:rPr lang="en-US" smtClean="0"/>
-              <a:t>10/12/2020</a:t>
+              <a:t>10/13/2020</a:t>
             </a:fld>
             <a:endParaRPr lang="en-US"/>
           </a:p>
@@ -2073,7 +2073,7 @@
           <a:p>
             <a:fld id="{2B467E7D-74A8-4588-B5EC-E88FCE43EB7F}" type="datetimeFigureOut">
               <a:rPr lang="en-US" smtClean="0"/>
-              <a:t>10/12/2020</a:t>
+              <a:t>10/13/2020</a:t>
             </a:fld>
             <a:endParaRPr lang="en-US"/>
           </a:p>
@@ -2384,7 +2384,7 @@
           <a:p>
             <a:fld id="{2B467E7D-74A8-4588-B5EC-E88FCE43EB7F}" type="datetimeFigureOut">
               <a:rPr lang="en-US" smtClean="0"/>
-              <a:t>10/12/2020</a:t>
+              <a:t>10/13/2020</a:t>
             </a:fld>
             <a:endParaRPr lang="en-US"/>
           </a:p>
@@ -2672,7 +2672,7 @@
           <a:p>
             <a:fld id="{2B467E7D-74A8-4588-B5EC-E88FCE43EB7F}" type="datetimeFigureOut">
               <a:rPr lang="en-US" smtClean="0"/>
-              <a:t>10/12/2020</a:t>
+              <a:t>10/13/2020</a:t>
             </a:fld>
             <a:endParaRPr lang="en-US"/>
           </a:p>
@@ -2913,7 +2913,7 @@
           <a:p>
             <a:fld id="{2B467E7D-74A8-4588-B5EC-E88FCE43EB7F}" type="datetimeFigureOut">
               <a:rPr lang="en-US" smtClean="0"/>
-              <a:t>10/12/2020</a:t>
+              <a:t>10/13/2020</a:t>
             </a:fld>
             <a:endParaRPr lang="en-US"/>
           </a:p>
@@ -3434,12 +3434,14 @@
         </p:nvSpPr>
         <p:spPr>
           <a:xfrm>
-            <a:off x="889000" y="-304800"/>
-            <a:ext cx="10515600" cy="1325563"/>
+            <a:off x="624114" y="169408"/>
+            <a:ext cx="10715171" cy="527278"/>
           </a:xfrm>
         </p:spPr>
         <p:txBody>
-          <a:bodyPr/>
+          <a:bodyPr>
+            <a:normAutofit fontScale="90000"/>
+          </a:bodyPr>
           <a:lstStyle/>
           <a:p>
             <a:pPr algn="ctr"/>
@@ -3465,14 +3467,14 @@
           <p:nvPr>
             <p:extLst>
               <p:ext uri="{D42A27DB-BD31-4B8C-83A1-F6EECF244321}">
-                <p14:modId xmlns:p14="http://schemas.microsoft.com/office/powerpoint/2010/main" val="2619600336"/>
+                <p14:modId xmlns:p14="http://schemas.microsoft.com/office/powerpoint/2010/main" val="1835460152"/>
               </p:ext>
             </p:extLst>
           </p:nvPr>
         </p:nvGraphicFramePr>
         <p:xfrm>
-          <a:off x="0" y="696686"/>
-          <a:ext cx="12192000" cy="6430941"/>
+          <a:off x="0" y="789140"/>
+          <a:ext cx="12192000" cy="6675120"/>
         </p:xfrm>
         <a:graphic>
           <a:graphicData uri="http://schemas.openxmlformats.org/drawingml/2006/table">
@@ -3496,7 +3498,7 @@
                   </a:extLst>
                 </a:gridCol>
               </a:tblGrid>
-              <a:tr h="365717">
+              <a:tr h="360502">
                 <a:tc>
                   <a:txBody>
                     <a:bodyPr/>
@@ -3529,7 +3531,7 @@
                   </a:ext>
                 </a:extLst>
               </a:tr>
-              <a:tr h="640005">
+              <a:tr h="630878">
                 <a:tc>
                   <a:txBody>
                     <a:bodyPr/>
@@ -3582,7 +3584,7 @@
                   </a:ext>
                 </a:extLst>
               </a:tr>
-              <a:tr h="370796">
+              <a:tr h="365465">
                 <a:tc>
                   <a:txBody>
                     <a:bodyPr/>
@@ -3619,7 +3621,7 @@
                   </a:ext>
                 </a:extLst>
               </a:tr>
-              <a:tr h="370796">
+              <a:tr h="365465">
                 <a:tc>
                   <a:txBody>
                     <a:bodyPr/>
@@ -3656,7 +3658,7 @@
                   </a:ext>
                 </a:extLst>
               </a:tr>
-              <a:tr h="640005">
+              <a:tr h="630878">
                 <a:tc>
                   <a:txBody>
                     <a:bodyPr/>
@@ -3699,7 +3701,7 @@
                   </a:ext>
                 </a:extLst>
               </a:tr>
-              <a:tr h="370796">
+              <a:tr h="365465">
                 <a:tc>
                   <a:txBody>
                     <a:bodyPr/>
@@ -3756,7 +3758,7 @@
                   </a:ext>
                 </a:extLst>
               </a:tr>
-              <a:tr h="370796">
+              <a:tr h="365465">
                 <a:tc>
                   <a:txBody>
                     <a:bodyPr/>
@@ -3793,7 +3795,7 @@
                   </a:ext>
                 </a:extLst>
               </a:tr>
-              <a:tr h="370796">
+              <a:tr h="365465">
                 <a:tc>
                   <a:txBody>
                     <a:bodyPr/>
@@ -3843,7 +3845,7 @@
                   </a:ext>
                 </a:extLst>
               </a:tr>
-              <a:tr h="640005">
+              <a:tr h="630878">
                 <a:tc>
                   <a:txBody>
                     <a:bodyPr/>
@@ -3896,7 +3898,7 @@
                   </a:ext>
                 </a:extLst>
               </a:tr>
-              <a:tr h="640005">
+              <a:tr h="630878">
                 <a:tc>
                   <a:txBody>
                     <a:bodyPr/>
@@ -3921,7 +3923,7 @@
                     <a:p>
                       <a:r>
                         <a:rPr lang="en-US" dirty="0"/>
-                        <a:t>[optional] Create experiment with variable cue duration times (16,33,55ms), would be good to find the threshold for conscious perception given our novel online presentation</a:t>
+                        <a:t>Create experiment with variable cue duration times (16,33,55ms), would be good to find the threshold for conscious perception given our novel online presentation</a:t>
                       </a:r>
                     </a:p>
                   </a:txBody>
@@ -3933,7 +3935,7 @@
                   </a:ext>
                 </a:extLst>
               </a:tr>
-              <a:tr h="370796">
+              <a:tr h="365465">
                 <a:tc>
                   <a:txBody>
                     <a:bodyPr/>
@@ -4012,7 +4014,7 @@
                   </a:ext>
                 </a:extLst>
               </a:tr>
-              <a:tr h="640005">
+              <a:tr h="630804">
                 <a:tc>
                   <a:txBody>
                     <a:bodyPr/>
@@ -4042,6 +4044,20 @@
                       <a:r>
                         <a:rPr lang="en-US" b="1" dirty="0"/>
                         <a:t>confirm KDEF face-directory with Elizabeth, and phase-scrambling technique) </a:t>
+                      </a:r>
+                    </a:p>
+                    <a:p>
+                      <a:r>
+                        <a:rPr lang="en-US" b="1" dirty="0"/>
+                        <a:t>-Point: further mask the </a:t>
+                      </a:r>
+                      <a:r>
+                        <a:rPr lang="en-US" b="1" dirty="0" err="1"/>
+                        <a:t>the</a:t>
+                      </a:r>
+                      <a:r>
+                        <a:rPr lang="en-US" b="1" dirty="0"/>
+                        <a:t> cue (less contrast as opposed to transition of white screen to cue). Phase-scramble the CUE-FACE. </a:t>
                       </a:r>
                       <a:endParaRPr lang="en-US" dirty="0"/>
                     </a:p>
@@ -4054,7 +4070,7 @@
                   </a:ext>
                 </a:extLst>
               </a:tr>
-              <a:tr h="370796">
+              <a:tr h="630878">
                 <a:tc>
                   <a:txBody>
                     <a:bodyPr/>

</xml_diff>